<commit_message>
Update GIS Web Application Development.pptx
</commit_message>
<xml_diff>
--- a/GIS Web Application Development.pptx
+++ b/GIS Web Application Development.pptx
@@ -5,7 +5,7 @@
     <p:sldMasterId id="2147483648" r:id="rId1"/>
   </p:sldMasterIdLst>
   <p:notesMasterIdLst>
-    <p:notesMasterId r:id="rId20"/>
+    <p:notesMasterId r:id="rId18"/>
   </p:notesMasterIdLst>
   <p:sldIdLst>
     <p:sldId id="256" r:id="rId2"/>
@@ -19,13 +19,11 @@
     <p:sldId id="273" r:id="rId10"/>
     <p:sldId id="262" r:id="rId11"/>
     <p:sldId id="267" r:id="rId12"/>
-    <p:sldId id="263" r:id="rId13"/>
-    <p:sldId id="265" r:id="rId14"/>
-    <p:sldId id="264" r:id="rId15"/>
-    <p:sldId id="266" r:id="rId16"/>
-    <p:sldId id="268" r:id="rId17"/>
-    <p:sldId id="269" r:id="rId18"/>
-    <p:sldId id="270" r:id="rId19"/>
+    <p:sldId id="265" r:id="rId13"/>
+    <p:sldId id="264" r:id="rId14"/>
+    <p:sldId id="266" r:id="rId15"/>
+    <p:sldId id="268" r:id="rId16"/>
+    <p:sldId id="270" r:id="rId17"/>
   </p:sldIdLst>
   <p:sldSz cx="12192000" cy="6858000"/>
   <p:notesSz cx="6858000" cy="9144000"/>
@@ -4582,9 +4580,12 @@
             </a:r>
           </a:p>
           <a:p>
-            <a:r>
-              <a:rPr lang="en-US" dirty="0"/>
-              <a:t>Adding navigation bars and buttons.</a:t>
+            <a:pPr marL="0" indent="0">
+              <a:buNone/>
+            </a:pPr>
+            <a:r>
+              <a:rPr lang="en-US" dirty="0"/>
+              <a:t>The tutorial for this is available a: https://kengeospatialist.github.io/Web-Mapping/</a:t>
             </a:r>
           </a:p>
           <a:p>
@@ -4596,7 +4597,7 @@
           <a:p>
             <a:r>
               <a:rPr lang="en-US" dirty="0"/>
-              <a:t>Adding tile layers.</a:t>
+              <a:t>Adding tile layers</a:t>
             </a:r>
           </a:p>
         </p:txBody>
@@ -4636,7 +4637,7 @@
           <p:cNvPr id="2" name="Title 1">
             <a:extLst>
               <a:ext uri="{FF2B5EF4-FFF2-40B4-BE49-F238E27FC236}">
-                <a16:creationId xmlns:a16="http://schemas.microsoft.com/office/drawing/2014/main" id="{508BAFBA-CFC6-4AF0-BC4F-113DB7AFC9D2}"/>
+                <a16:creationId xmlns:a16="http://schemas.microsoft.com/office/drawing/2014/main" id="{CA722DDA-9E0F-4065-A865-88CF67D758CA}"/>
               </a:ext>
             </a:extLst>
           </p:cNvPr>
@@ -4654,7 +4655,7 @@
           <a:p>
             <a:r>
               <a:rPr lang="en-US" dirty="0"/>
-              <a:t>Building the Basic Map</a:t>
+              <a:t>Adding Markers and Popups</a:t>
             </a:r>
           </a:p>
         </p:txBody>
@@ -4664,7 +4665,7 @@
           <p:cNvPr id="3" name="Content Placeholder 2">
             <a:extLst>
               <a:ext uri="{FF2B5EF4-FFF2-40B4-BE49-F238E27FC236}">
-                <a16:creationId xmlns:a16="http://schemas.microsoft.com/office/drawing/2014/main" id="{9DCB66EF-A46E-4A7F-93F7-497A76ED9DDD}"/>
+                <a16:creationId xmlns:a16="http://schemas.microsoft.com/office/drawing/2014/main" id="{5E4871D5-5D2C-4D9E-B50E-B4CC740D40D3}"/>
               </a:ext>
             </a:extLst>
           </p:cNvPr>
@@ -4682,27 +4683,39 @@
           <a:p>
             <a:r>
               <a:rPr lang="en-US" dirty="0"/>
-              <a:t>HTML structure for the map.</a:t>
-            </a:r>
-          </a:p>
-          <a:p>
-            <a:r>
-              <a:rPr lang="en-US" dirty="0"/>
-              <a:t>Initializing the map with Leaflet.</a:t>
-            </a:r>
-          </a:p>
-          <a:p>
-            <a:r>
-              <a:rPr lang="en-US" dirty="0"/>
-              <a:t>Adding tile layers.</a:t>
-            </a:r>
+              <a:t>Creating markers.</a:t>
+            </a:r>
+          </a:p>
+          <a:p>
+            <a:r>
+              <a:rPr lang="en-US" dirty="0"/>
+              <a:t>Adding popups.</a:t>
+            </a:r>
+          </a:p>
+          <a:p>
+            <a:r>
+              <a:rPr lang="en-US" dirty="0"/>
+              <a:t>Customizing markers and popups.</a:t>
+            </a:r>
+          </a:p>
+          <a:p>
+            <a:pPr marL="0" indent="0">
+              <a:buNone/>
+            </a:pPr>
+            <a:r>
+              <a:rPr lang="en-US" dirty="0"/>
+              <a:t>The tutorial for this is available a: https://kengeospatialist.github.io/Web-Mapping/</a:t>
+            </a:r>
+          </a:p>
+          <a:p>
+            <a:endParaRPr lang="en-US" dirty="0"/>
           </a:p>
         </p:txBody>
       </p:sp>
     </p:spTree>
     <p:extLst>
       <p:ext uri="{BB962C8B-B14F-4D97-AF65-F5344CB8AC3E}">
-        <p14:creationId xmlns:p14="http://schemas.microsoft.com/office/powerpoint/2010/main" val="1246218236"/>
+        <p14:creationId xmlns:p14="http://schemas.microsoft.com/office/powerpoint/2010/main" val="798972262"/>
       </p:ext>
     </p:extLst>
   </p:cSld>
@@ -4734,7 +4747,7 @@
           <p:cNvPr id="2" name="Title 1">
             <a:extLst>
               <a:ext uri="{FF2B5EF4-FFF2-40B4-BE49-F238E27FC236}">
-                <a16:creationId xmlns:a16="http://schemas.microsoft.com/office/drawing/2014/main" id="{CA722DDA-9E0F-4065-A865-88CF67D758CA}"/>
+                <a16:creationId xmlns:a16="http://schemas.microsoft.com/office/drawing/2014/main" id="{6D02E400-74E5-48DF-998D-9FB4A7ECC649}"/>
               </a:ext>
             </a:extLst>
           </p:cNvPr>
@@ -4752,7 +4765,15 @@
           <a:p>
             <a:r>
               <a:rPr lang="en-US" dirty="0"/>
-              <a:t>Adding Markers and Popups</a:t>
+              <a:t>Working with </a:t>
+            </a:r>
+            <a:r>
+              <a:rPr lang="en-US" dirty="0" err="1"/>
+              <a:t>GeoJSON</a:t>
+            </a:r>
+            <a:r>
+              <a:rPr lang="en-US" dirty="0"/>
+              <a:t> Data</a:t>
             </a:r>
           </a:p>
         </p:txBody>
@@ -4762,7 +4783,7 @@
           <p:cNvPr id="3" name="Content Placeholder 2">
             <a:extLst>
               <a:ext uri="{FF2B5EF4-FFF2-40B4-BE49-F238E27FC236}">
-                <a16:creationId xmlns:a16="http://schemas.microsoft.com/office/drawing/2014/main" id="{5E4871D5-5D2C-4D9E-B50E-B4CC740D40D3}"/>
+                <a16:creationId xmlns:a16="http://schemas.microsoft.com/office/drawing/2014/main" id="{3F3BD666-1DF1-4E80-9F6F-B62227419950}"/>
               </a:ext>
             </a:extLst>
           </p:cNvPr>
@@ -4780,27 +4801,63 @@
           <a:p>
             <a:r>
               <a:rPr lang="en-US" dirty="0"/>
-              <a:t>Creating markers.</a:t>
-            </a:r>
-          </a:p>
-          <a:p>
-            <a:r>
-              <a:rPr lang="en-US" dirty="0"/>
-              <a:t>Adding popups.</a:t>
-            </a:r>
-          </a:p>
-          <a:p>
-            <a:r>
-              <a:rPr lang="en-US" dirty="0"/>
-              <a:t>Customizing markers and popups.</a:t>
-            </a:r>
+              <a:t>Understanding </a:t>
+            </a:r>
+            <a:r>
+              <a:rPr lang="en-US" dirty="0" err="1"/>
+              <a:t>GeoJSON</a:t>
+            </a:r>
+            <a:r>
+              <a:rPr lang="en-US" dirty="0"/>
+              <a:t> structure.</a:t>
+            </a:r>
+          </a:p>
+          <a:p>
+            <a:r>
+              <a:rPr lang="en-US" dirty="0"/>
+              <a:t>Loading </a:t>
+            </a:r>
+            <a:r>
+              <a:rPr lang="en-US" dirty="0" err="1"/>
+              <a:t>GeoJSON</a:t>
+            </a:r>
+            <a:r>
+              <a:rPr lang="en-US" dirty="0"/>
+              <a:t> data.</a:t>
+            </a:r>
+          </a:p>
+          <a:p>
+            <a:r>
+              <a:rPr lang="en-US" dirty="0"/>
+              <a:t>Styling </a:t>
+            </a:r>
+            <a:r>
+              <a:rPr lang="en-US" dirty="0" err="1"/>
+              <a:t>GeoJSON</a:t>
+            </a:r>
+            <a:r>
+              <a:rPr lang="en-US" dirty="0"/>
+              <a:t> layers.</a:t>
+            </a:r>
+          </a:p>
+          <a:p>
+            <a:pPr marL="0" indent="0">
+              <a:buNone/>
+            </a:pPr>
+            <a:r>
+              <a:rPr lang="en-US" dirty="0"/>
+              <a:t>The tutorial for this is available a: https://kengeospatialist.github.io/Web-Mapping/</a:t>
+            </a:r>
+          </a:p>
+          <a:p>
+            <a:endParaRPr lang="en-US" dirty="0"/>
           </a:p>
         </p:txBody>
       </p:sp>
     </p:spTree>
     <p:extLst>
       <p:ext uri="{BB962C8B-B14F-4D97-AF65-F5344CB8AC3E}">
-        <p14:creationId xmlns:p14="http://schemas.microsoft.com/office/powerpoint/2010/main" val="798972262"/>
+        <p14:creationId xmlns:p14="http://schemas.microsoft.com/office/powerpoint/2010/main" val="2387533445"/>
       </p:ext>
     </p:extLst>
   </p:cSld>
@@ -4832,7 +4889,7 @@
           <p:cNvPr id="2" name="Title 1">
             <a:extLst>
               <a:ext uri="{FF2B5EF4-FFF2-40B4-BE49-F238E27FC236}">
-                <a16:creationId xmlns:a16="http://schemas.microsoft.com/office/drawing/2014/main" id="{6D02E400-74E5-48DF-998D-9FB4A7ECC649}"/>
+                <a16:creationId xmlns:a16="http://schemas.microsoft.com/office/drawing/2014/main" id="{7D668BCA-25FD-4F89-B16B-84FB66C36E0A}"/>
               </a:ext>
             </a:extLst>
           </p:cNvPr>
@@ -4850,15 +4907,7 @@
           <a:p>
             <a:r>
               <a:rPr lang="en-US" dirty="0"/>
-              <a:t>Working with </a:t>
-            </a:r>
-            <a:r>
-              <a:rPr lang="en-US" dirty="0" err="1"/>
-              <a:t>GeoJSON</a:t>
-            </a:r>
-            <a:r>
-              <a:rPr lang="en-US" dirty="0"/>
-              <a:t> Data</a:t>
+              <a:t>User Interaction</a:t>
             </a:r>
           </a:p>
         </p:txBody>
@@ -4868,7 +4917,7 @@
           <p:cNvPr id="3" name="Content Placeholder 2">
             <a:extLst>
               <a:ext uri="{FF2B5EF4-FFF2-40B4-BE49-F238E27FC236}">
-                <a16:creationId xmlns:a16="http://schemas.microsoft.com/office/drawing/2014/main" id="{3F3BD666-1DF1-4E80-9F6F-B62227419950}"/>
+                <a16:creationId xmlns:a16="http://schemas.microsoft.com/office/drawing/2014/main" id="{E3D7C99F-E40D-4C38-A0A7-DAEB7C7B3B03}"/>
               </a:ext>
             </a:extLst>
           </p:cNvPr>
@@ -4886,43 +4935,22 @@
           <a:p>
             <a:r>
               <a:rPr lang="en-US" dirty="0"/>
-              <a:t>Understanding </a:t>
-            </a:r>
-            <a:r>
-              <a:rPr lang="en-US" dirty="0" err="1"/>
-              <a:t>GeoJSON</a:t>
-            </a:r>
-            <a:r>
-              <a:rPr lang="en-US" dirty="0"/>
-              <a:t> structure.</a:t>
-            </a:r>
-          </a:p>
-          <a:p>
-            <a:r>
-              <a:rPr lang="en-US" dirty="0"/>
-              <a:t>Loading </a:t>
-            </a:r>
-            <a:r>
-              <a:rPr lang="en-US" dirty="0" err="1"/>
-              <a:t>GeoJSON</a:t>
-            </a:r>
-            <a:r>
-              <a:rPr lang="en-US" dirty="0"/>
-              <a:t> data.</a:t>
-            </a:r>
-          </a:p>
-          <a:p>
-            <a:r>
-              <a:rPr lang="en-US" dirty="0"/>
-              <a:t>Styling </a:t>
-            </a:r>
-            <a:r>
-              <a:rPr lang="en-US" dirty="0" err="1"/>
-              <a:t>GeoJSON</a:t>
-            </a:r>
-            <a:r>
-              <a:rPr lang="en-US" dirty="0"/>
-              <a:t> layers.</a:t>
+              <a:t>Handling map events.</a:t>
+            </a:r>
+          </a:p>
+          <a:p>
+            <a:r>
+              <a:rPr lang="en-US" dirty="0"/>
+              <a:t>Interactive layers and controls.</a:t>
+            </a:r>
+          </a:p>
+          <a:p>
+            <a:pPr marL="0" indent="0">
+              <a:buNone/>
+            </a:pPr>
+            <a:r>
+              <a:rPr lang="en-US" dirty="0"/>
+              <a:t>The tutorial for this is available a: https://kengeospatialist.github.io/Web-Mapping/</a:t>
             </a:r>
           </a:p>
         </p:txBody>
@@ -4930,7 +4958,7 @@
     </p:spTree>
     <p:extLst>
       <p:ext uri="{BB962C8B-B14F-4D97-AF65-F5344CB8AC3E}">
-        <p14:creationId xmlns:p14="http://schemas.microsoft.com/office/powerpoint/2010/main" val="2387533445"/>
+        <p14:creationId xmlns:p14="http://schemas.microsoft.com/office/powerpoint/2010/main" val="3622501965"/>
       </p:ext>
     </p:extLst>
   </p:cSld>
@@ -4962,7 +4990,7 @@
           <p:cNvPr id="2" name="Title 1">
             <a:extLst>
               <a:ext uri="{FF2B5EF4-FFF2-40B4-BE49-F238E27FC236}">
-                <a16:creationId xmlns:a16="http://schemas.microsoft.com/office/drawing/2014/main" id="{7D668BCA-25FD-4F89-B16B-84FB66C36E0A}"/>
+                <a16:creationId xmlns:a16="http://schemas.microsoft.com/office/drawing/2014/main" id="{745883F6-69E5-4BDA-A736-3AC5800D12DD}"/>
               </a:ext>
             </a:extLst>
           </p:cNvPr>
@@ -4980,7 +5008,7 @@
           <a:p>
             <a:r>
               <a:rPr lang="en-US" dirty="0"/>
-              <a:t>User Interaction</a:t>
+              <a:t>Example Project</a:t>
             </a:r>
           </a:p>
         </p:txBody>
@@ -4990,7 +5018,7 @@
           <p:cNvPr id="3" name="Content Placeholder 2">
             <a:extLst>
               <a:ext uri="{FF2B5EF4-FFF2-40B4-BE49-F238E27FC236}">
-                <a16:creationId xmlns:a16="http://schemas.microsoft.com/office/drawing/2014/main" id="{E3D7C99F-E40D-4C38-A0A7-DAEB7C7B3B03}"/>
+                <a16:creationId xmlns:a16="http://schemas.microsoft.com/office/drawing/2014/main" id="{EEA6BD1B-7686-4BDE-A5BC-F3B9EC6AD898}"/>
               </a:ext>
             </a:extLst>
           </p:cNvPr>
@@ -5006,15 +5034,12 @@
           <a:bodyPr/>
           <a:lstStyle/>
           <a:p>
-            <a:r>
-              <a:rPr lang="en-US" dirty="0"/>
-              <a:t>Handling map events.</a:t>
-            </a:r>
-          </a:p>
-          <a:p>
-            <a:r>
-              <a:rPr lang="en-US" dirty="0"/>
-              <a:t>Interactive layers and controls.</a:t>
+            <a:pPr marL="0" indent="0">
+              <a:buNone/>
+            </a:pPr>
+            <a:r>
+              <a:rPr lang="en-US" dirty="0"/>
+              <a:t>The tutorial for this is available a: https://kengeospatialist.github.io/Web-Mapping/</a:t>
             </a:r>
           </a:p>
         </p:txBody>
@@ -5022,7 +5047,7 @@
     </p:spTree>
     <p:extLst>
       <p:ext uri="{BB962C8B-B14F-4D97-AF65-F5344CB8AC3E}">
-        <p14:creationId xmlns:p14="http://schemas.microsoft.com/office/powerpoint/2010/main" val="3622501965"/>
+        <p14:creationId xmlns:p14="http://schemas.microsoft.com/office/powerpoint/2010/main" val="459501508"/>
       </p:ext>
     </p:extLst>
   </p:cSld>
@@ -5054,7 +5079,7 @@
           <p:cNvPr id="2" name="Title 1">
             <a:extLst>
               <a:ext uri="{FF2B5EF4-FFF2-40B4-BE49-F238E27FC236}">
-                <a16:creationId xmlns:a16="http://schemas.microsoft.com/office/drawing/2014/main" id="{745883F6-69E5-4BDA-A736-3AC5800D12DD}"/>
+                <a16:creationId xmlns:a16="http://schemas.microsoft.com/office/drawing/2014/main" id="{322426ED-77DA-4F11-A9FF-7AEA1ADC1678}"/>
               </a:ext>
             </a:extLst>
           </p:cNvPr>
@@ -5072,7 +5097,7 @@
           <a:p>
             <a:r>
               <a:rPr lang="en-US" dirty="0"/>
-              <a:t>Advanced Features</a:t>
+              <a:t>Q&amp;A</a:t>
             </a:r>
           </a:p>
         </p:txBody>
@@ -5082,7 +5107,7 @@
           <p:cNvPr id="3" name="Content Placeholder 2">
             <a:extLst>
               <a:ext uri="{FF2B5EF4-FFF2-40B4-BE49-F238E27FC236}">
-                <a16:creationId xmlns:a16="http://schemas.microsoft.com/office/drawing/2014/main" id="{EEA6BD1B-7686-4BDE-A5BC-F3B9EC6AD898}"/>
+                <a16:creationId xmlns:a16="http://schemas.microsoft.com/office/drawing/2014/main" id="{62184B1E-AFD0-4FB9-9E1C-3B8B61E4238D}"/>
               </a:ext>
             </a:extLst>
           </p:cNvPr>
@@ -5100,209 +5125,7 @@
           <a:p>
             <a:r>
               <a:rPr lang="en-US" dirty="0"/>
-              <a:t>Dynamic data loading.</a:t>
-            </a:r>
-          </a:p>
-          <a:p>
-            <a:r>
-              <a:rPr lang="en-US" dirty="0"/>
-              <a:t>Custom controls and plugins.</a:t>
-            </a:r>
-          </a:p>
-          <a:p>
-            <a:r>
-              <a:rPr lang="en-US" dirty="0"/>
-              <a:t>Examples of advanced features.</a:t>
-            </a:r>
-          </a:p>
-        </p:txBody>
-      </p:sp>
-    </p:spTree>
-    <p:extLst>
-      <p:ext uri="{BB962C8B-B14F-4D97-AF65-F5344CB8AC3E}">
-        <p14:creationId xmlns:p14="http://schemas.microsoft.com/office/powerpoint/2010/main" val="459501508"/>
-      </p:ext>
-    </p:extLst>
-  </p:cSld>
-  <p:clrMapOvr>
-    <a:masterClrMapping/>
-  </p:clrMapOvr>
-</p:sld>
-</file>
-
-<file path=ppt/slides/slide17.xml><?xml version="1.0" encoding="utf-8"?>
-<p:sld xmlns:a="http://schemas.openxmlformats.org/drawingml/2006/main" xmlns:r="http://schemas.openxmlformats.org/officeDocument/2006/relationships" xmlns:p="http://schemas.openxmlformats.org/presentationml/2006/main">
-  <p:cSld>
-    <p:spTree>
-      <p:nvGrpSpPr>
-        <p:cNvPr id="1" name=""/>
-        <p:cNvGrpSpPr/>
-        <p:nvPr/>
-      </p:nvGrpSpPr>
-      <p:grpSpPr>
-        <a:xfrm>
-          <a:off x="0" y="0"/>
-          <a:ext cx="0" cy="0"/>
-          <a:chOff x="0" y="0"/>
-          <a:chExt cx="0" cy="0"/>
-        </a:xfrm>
-      </p:grpSpPr>
-      <p:sp>
-        <p:nvSpPr>
-          <p:cNvPr id="2" name="Title 1">
-            <a:extLst>
-              <a:ext uri="{FF2B5EF4-FFF2-40B4-BE49-F238E27FC236}">
-                <a16:creationId xmlns:a16="http://schemas.microsoft.com/office/drawing/2014/main" id="{5DB7CCD3-6856-41EA-A4D0-0274DE22AF73}"/>
-              </a:ext>
-            </a:extLst>
-          </p:cNvPr>
-          <p:cNvSpPr>
-            <a:spLocks noGrp="1"/>
-          </p:cNvSpPr>
-          <p:nvPr>
-            <p:ph type="title"/>
-          </p:nvPr>
-        </p:nvSpPr>
-        <p:spPr/>
-        <p:txBody>
-          <a:bodyPr/>
-          <a:lstStyle/>
-          <a:p>
-            <a:r>
-              <a:rPr lang="en-US" dirty="0"/>
-              <a:t>Testing and Deployment</a:t>
-            </a:r>
-          </a:p>
-        </p:txBody>
-      </p:sp>
-      <p:sp>
-        <p:nvSpPr>
-          <p:cNvPr id="3" name="Content Placeholder 2">
-            <a:extLst>
-              <a:ext uri="{FF2B5EF4-FFF2-40B4-BE49-F238E27FC236}">
-                <a16:creationId xmlns:a16="http://schemas.microsoft.com/office/drawing/2014/main" id="{02757F64-DDAB-4E90-8425-2DA15F35BEF8}"/>
-              </a:ext>
-            </a:extLst>
-          </p:cNvPr>
-          <p:cNvSpPr>
-            <a:spLocks noGrp="1"/>
-          </p:cNvSpPr>
-          <p:nvPr>
-            <p:ph idx="1"/>
-          </p:nvPr>
-        </p:nvSpPr>
-        <p:spPr/>
-        <p:txBody>
-          <a:bodyPr/>
-          <a:lstStyle/>
-          <a:p>
-            <a:r>
-              <a:rPr lang="en-US" dirty="0"/>
-              <a:t>Testing the application.</a:t>
-            </a:r>
-          </a:p>
-          <a:p>
-            <a:r>
-              <a:rPr lang="en-US" dirty="0"/>
-              <a:t>Deployment options.</a:t>
-            </a:r>
-          </a:p>
-          <a:p>
-            <a:r>
-              <a:rPr lang="en-US" dirty="0"/>
-              <a:t>Steps for deployment.</a:t>
-            </a:r>
-          </a:p>
-        </p:txBody>
-      </p:sp>
-    </p:spTree>
-    <p:extLst>
-      <p:ext uri="{BB962C8B-B14F-4D97-AF65-F5344CB8AC3E}">
-        <p14:creationId xmlns:p14="http://schemas.microsoft.com/office/powerpoint/2010/main" val="3042685918"/>
-      </p:ext>
-    </p:extLst>
-  </p:cSld>
-  <p:clrMapOvr>
-    <a:masterClrMapping/>
-  </p:clrMapOvr>
-</p:sld>
-</file>
-
-<file path=ppt/slides/slide18.xml><?xml version="1.0" encoding="utf-8"?>
-<p:sld xmlns:a="http://schemas.openxmlformats.org/drawingml/2006/main" xmlns:r="http://schemas.openxmlformats.org/officeDocument/2006/relationships" xmlns:p="http://schemas.openxmlformats.org/presentationml/2006/main">
-  <p:cSld>
-    <p:spTree>
-      <p:nvGrpSpPr>
-        <p:cNvPr id="1" name=""/>
-        <p:cNvGrpSpPr/>
-        <p:nvPr/>
-      </p:nvGrpSpPr>
-      <p:grpSpPr>
-        <a:xfrm>
-          <a:off x="0" y="0"/>
-          <a:ext cx="0" cy="0"/>
-          <a:chOff x="0" y="0"/>
-          <a:chExt cx="0" cy="0"/>
-        </a:xfrm>
-      </p:grpSpPr>
-      <p:sp>
-        <p:nvSpPr>
-          <p:cNvPr id="2" name="Title 1">
-            <a:extLst>
-              <a:ext uri="{FF2B5EF4-FFF2-40B4-BE49-F238E27FC236}">
-                <a16:creationId xmlns:a16="http://schemas.microsoft.com/office/drawing/2014/main" id="{322426ED-77DA-4F11-A9FF-7AEA1ADC1678}"/>
-              </a:ext>
-            </a:extLst>
-          </p:cNvPr>
-          <p:cNvSpPr>
-            <a:spLocks noGrp="1"/>
-          </p:cNvSpPr>
-          <p:nvPr>
-            <p:ph type="title"/>
-          </p:nvPr>
-        </p:nvSpPr>
-        <p:spPr/>
-        <p:txBody>
-          <a:bodyPr/>
-          <a:lstStyle/>
-          <a:p>
-            <a:r>
-              <a:rPr lang="en-US" dirty="0"/>
-              <a:t>Q&amp;A and Wrap-Up</a:t>
-            </a:r>
-          </a:p>
-        </p:txBody>
-      </p:sp>
-      <p:sp>
-        <p:nvSpPr>
-          <p:cNvPr id="3" name="Content Placeholder 2">
-            <a:extLst>
-              <a:ext uri="{FF2B5EF4-FFF2-40B4-BE49-F238E27FC236}">
-                <a16:creationId xmlns:a16="http://schemas.microsoft.com/office/drawing/2014/main" id="{62184B1E-AFD0-4FB9-9E1C-3B8B61E4238D}"/>
-              </a:ext>
-            </a:extLst>
-          </p:cNvPr>
-          <p:cNvSpPr>
-            <a:spLocks noGrp="1"/>
-          </p:cNvSpPr>
-          <p:nvPr>
-            <p:ph idx="1"/>
-          </p:nvPr>
-        </p:nvSpPr>
-        <p:spPr/>
-        <p:txBody>
-          <a:bodyPr/>
-          <a:lstStyle/>
-          <a:p>
-            <a:r>
-              <a:rPr lang="en-US" dirty="0"/>
               <a:t>Open floor for questions.</a:t>
-            </a:r>
-          </a:p>
-          <a:p>
-            <a:r>
-              <a:rPr lang="en-US" dirty="0"/>
-              <a:t>Recap and resources for further learning.</a:t>
             </a:r>
           </a:p>
         </p:txBody>

</xml_diff>